<commit_message>
Add detail to ppt
</commit_message>
<xml_diff>
--- a/Documentation/Planning/wireframe_1.pptx
+++ b/Documentation/Planning/wireframe_1.pptx
@@ -283,7 +283,7 @@
           <a:p>
             <a:fld id="{BDD1807A-24FC-4EDA-B875-A70CBA16F5EE}" type="datetimeFigureOut">
               <a:rPr lang="en-ZA" smtClean="0"/>
-              <a:t>2021/09/28</a:t>
+              <a:t>2021/09/29</a:t>
             </a:fld>
             <a:endParaRPr lang="en-ZA"/>
           </a:p>
@@ -483,7 +483,7 @@
           <a:p>
             <a:fld id="{BDD1807A-24FC-4EDA-B875-A70CBA16F5EE}" type="datetimeFigureOut">
               <a:rPr lang="en-ZA" smtClean="0"/>
-              <a:t>2021/09/28</a:t>
+              <a:t>2021/09/29</a:t>
             </a:fld>
             <a:endParaRPr lang="en-ZA"/>
           </a:p>
@@ -693,7 +693,7 @@
           <a:p>
             <a:fld id="{BDD1807A-24FC-4EDA-B875-A70CBA16F5EE}" type="datetimeFigureOut">
               <a:rPr lang="en-ZA" smtClean="0"/>
-              <a:t>2021/09/28</a:t>
+              <a:t>2021/09/29</a:t>
             </a:fld>
             <a:endParaRPr lang="en-ZA"/>
           </a:p>
@@ -893,7 +893,7 @@
           <a:p>
             <a:fld id="{BDD1807A-24FC-4EDA-B875-A70CBA16F5EE}" type="datetimeFigureOut">
               <a:rPr lang="en-ZA" smtClean="0"/>
-              <a:t>2021/09/28</a:t>
+              <a:t>2021/09/29</a:t>
             </a:fld>
             <a:endParaRPr lang="en-ZA"/>
           </a:p>
@@ -1169,7 +1169,7 @@
           <a:p>
             <a:fld id="{BDD1807A-24FC-4EDA-B875-A70CBA16F5EE}" type="datetimeFigureOut">
               <a:rPr lang="en-ZA" smtClean="0"/>
-              <a:t>2021/09/28</a:t>
+              <a:t>2021/09/29</a:t>
             </a:fld>
             <a:endParaRPr lang="en-ZA"/>
           </a:p>
@@ -1437,7 +1437,7 @@
           <a:p>
             <a:fld id="{BDD1807A-24FC-4EDA-B875-A70CBA16F5EE}" type="datetimeFigureOut">
               <a:rPr lang="en-ZA" smtClean="0"/>
-              <a:t>2021/09/28</a:t>
+              <a:t>2021/09/29</a:t>
             </a:fld>
             <a:endParaRPr lang="en-ZA"/>
           </a:p>
@@ -1852,7 +1852,7 @@
           <a:p>
             <a:fld id="{BDD1807A-24FC-4EDA-B875-A70CBA16F5EE}" type="datetimeFigureOut">
               <a:rPr lang="en-ZA" smtClean="0"/>
-              <a:t>2021/09/28</a:t>
+              <a:t>2021/09/29</a:t>
             </a:fld>
             <a:endParaRPr lang="en-ZA"/>
           </a:p>
@@ -1994,7 +1994,7 @@
           <a:p>
             <a:fld id="{BDD1807A-24FC-4EDA-B875-A70CBA16F5EE}" type="datetimeFigureOut">
               <a:rPr lang="en-ZA" smtClean="0"/>
-              <a:t>2021/09/28</a:t>
+              <a:t>2021/09/29</a:t>
             </a:fld>
             <a:endParaRPr lang="en-ZA"/>
           </a:p>
@@ -2107,7 +2107,7 @@
           <a:p>
             <a:fld id="{BDD1807A-24FC-4EDA-B875-A70CBA16F5EE}" type="datetimeFigureOut">
               <a:rPr lang="en-ZA" smtClean="0"/>
-              <a:t>2021/09/28</a:t>
+              <a:t>2021/09/29</a:t>
             </a:fld>
             <a:endParaRPr lang="en-ZA"/>
           </a:p>
@@ -2420,7 +2420,7 @@
           <a:p>
             <a:fld id="{BDD1807A-24FC-4EDA-B875-A70CBA16F5EE}" type="datetimeFigureOut">
               <a:rPr lang="en-ZA" smtClean="0"/>
-              <a:t>2021/09/28</a:t>
+              <a:t>2021/09/29</a:t>
             </a:fld>
             <a:endParaRPr lang="en-ZA"/>
           </a:p>
@@ -2709,7 +2709,7 @@
           <a:p>
             <a:fld id="{BDD1807A-24FC-4EDA-B875-A70CBA16F5EE}" type="datetimeFigureOut">
               <a:rPr lang="en-ZA" smtClean="0"/>
-              <a:t>2021/09/28</a:t>
+              <a:t>2021/09/29</a:t>
             </a:fld>
             <a:endParaRPr lang="en-ZA"/>
           </a:p>
@@ -2952,7 +2952,7 @@
           <a:p>
             <a:fld id="{BDD1807A-24FC-4EDA-B875-A70CBA16F5EE}" type="datetimeFigureOut">
               <a:rPr lang="en-ZA" smtClean="0"/>
-              <a:t>2021/09/28</a:t>
+              <a:t>2021/09/29</a:t>
             </a:fld>
             <a:endParaRPr lang="en-ZA"/>
           </a:p>
@@ -3702,7 +3702,7 @@
         </p:nvSpPr>
         <p:spPr>
           <a:xfrm>
-            <a:off x="1852155" y="2941782"/>
+            <a:off x="2556197" y="3052354"/>
             <a:ext cx="249382" cy="212436"/>
           </a:xfrm>
           <a:prstGeom prst="star7">

</xml_diff>

<commit_message>
Add DB create scripts
</commit_message>
<xml_diff>
--- a/Documentation/Planning/wireframe_1.pptx
+++ b/Documentation/Planning/wireframe_1.pptx
@@ -3817,7 +3817,7 @@
         <p:spPr>
           <a:xfrm>
             <a:off x="4072379" y="2432116"/>
-            <a:ext cx="2790334" cy="1649690"/>
+            <a:ext cx="3018534" cy="1649690"/>
           </a:xfrm>
           <a:prstGeom prst="flowChartInternalStorage">
             <a:avLst/>
@@ -3847,12 +3847,267 @@
           <a:lstStyle/>
           <a:p>
             <a:r>
+              <a:rPr lang="en-ZA" sz="800" dirty="0">
+                <a:solidFill>
+                  <a:schemeClr val="tx1"/>
+                </a:solidFill>
+              </a:rPr>
+              <a:t>Create table </a:t>
+            </a:r>
+            <a:r>
+              <a:rPr lang="en-ZA" sz="800" dirty="0" err="1">
+                <a:solidFill>
+                  <a:schemeClr val="tx1"/>
+                </a:solidFill>
+              </a:rPr>
+              <a:t>base_sync</a:t>
+            </a:r>
+            <a:r>
+              <a:rPr lang="en-ZA" sz="800" dirty="0">
+                <a:solidFill>
+                  <a:schemeClr val="tx1"/>
+                </a:solidFill>
+              </a:rPr>
+              <a:t> {</a:t>
+            </a:r>
+          </a:p>
+          <a:p>
+            <a:r>
+              <a:rPr lang="en-ZA" sz="800" dirty="0">
+                <a:solidFill>
+                  <a:schemeClr val="tx1"/>
+                </a:solidFill>
+              </a:rPr>
+              <a:t>Id int primary key autoincrement,</a:t>
+            </a:r>
+          </a:p>
+          <a:p>
+            <a:r>
+              <a:rPr lang="en-ZA" sz="800" dirty="0">
+                <a:solidFill>
+                  <a:schemeClr val="tx1"/>
+                </a:solidFill>
+              </a:rPr>
+              <a:t>Foreign key (</a:t>
+            </a:r>
+            <a:r>
+              <a:rPr lang="en-ZA" sz="800" dirty="0" err="1">
+                <a:solidFill>
+                  <a:schemeClr val="tx1"/>
+                </a:solidFill>
+              </a:rPr>
+              <a:t>base_id</a:t>
+            </a:r>
+            <a:r>
+              <a:rPr lang="en-ZA" sz="800" dirty="0">
+                <a:solidFill>
+                  <a:schemeClr val="tx1"/>
+                </a:solidFill>
+              </a:rPr>
+              <a:t>) reference  </a:t>
+            </a:r>
+            <a:r>
+              <a:rPr lang="en-ZA" sz="800" dirty="0" err="1">
+                <a:solidFill>
+                  <a:schemeClr val="tx1"/>
+                </a:solidFill>
+              </a:rPr>
+              <a:t>base_station</a:t>
+            </a:r>
+            <a:r>
+              <a:rPr lang="en-ZA" sz="800" dirty="0">
+                <a:solidFill>
+                  <a:schemeClr val="tx1"/>
+                </a:solidFill>
+              </a:rPr>
+              <a:t> (id) ,</a:t>
+            </a:r>
+          </a:p>
+          <a:p>
+            <a:r>
+              <a:rPr lang="en-ZA" sz="800" dirty="0">
+                <a:solidFill>
+                  <a:schemeClr val="tx1"/>
+                </a:solidFill>
+              </a:rPr>
+              <a:t>Foreign key (</a:t>
+            </a:r>
+            <a:r>
+              <a:rPr lang="en-ZA" sz="800" dirty="0" err="1">
+                <a:solidFill>
+                  <a:schemeClr val="tx1"/>
+                </a:solidFill>
+              </a:rPr>
+              <a:t>tag_id</a:t>
+            </a:r>
+            <a:r>
+              <a:rPr lang="en-ZA" sz="800" dirty="0">
+                <a:solidFill>
+                  <a:schemeClr val="tx1"/>
+                </a:solidFill>
+              </a:rPr>
+              <a:t>) references </a:t>
+            </a:r>
+            <a:r>
+              <a:rPr lang="en-ZA" sz="800" dirty="0" err="1">
+                <a:solidFill>
+                  <a:schemeClr val="tx1"/>
+                </a:solidFill>
+              </a:rPr>
+              <a:t>tag_name</a:t>
+            </a:r>
+            <a:r>
+              <a:rPr lang="en-ZA" sz="800" dirty="0">
+                <a:solidFill>
+                  <a:schemeClr val="tx1"/>
+                </a:solidFill>
+              </a:rPr>
+              <a:t>( id)</a:t>
+            </a:r>
+          </a:p>
+          <a:p>
+            <a:r>
+              <a:rPr lang="en-ZA" sz="800" dirty="0">
+                <a:solidFill>
+                  <a:schemeClr val="tx1"/>
+                </a:solidFill>
+              </a:rPr>
+              <a:t>Created timestamp not null default </a:t>
+            </a:r>
+            <a:r>
+              <a:rPr lang="en-ZA" sz="800" dirty="0" err="1">
+                <a:solidFill>
+                  <a:schemeClr val="tx1"/>
+                </a:solidFill>
+              </a:rPr>
+              <a:t>current_timestamp</a:t>
+            </a:r>
+            <a:r>
+              <a:rPr lang="en-ZA" sz="800" dirty="0">
+                <a:solidFill>
+                  <a:schemeClr val="tx1"/>
+                </a:solidFill>
+              </a:rPr>
+              <a:t>,</a:t>
+            </a:r>
+          </a:p>
+          <a:p>
+            <a:r>
+              <a:rPr lang="en-ZA" sz="800" dirty="0" err="1">
+                <a:solidFill>
+                  <a:schemeClr val="tx1"/>
+                </a:solidFill>
+              </a:rPr>
+              <a:t>GPS_local</a:t>
+            </a:r>
+            <a:r>
+              <a:rPr lang="en-ZA" sz="800" dirty="0">
+                <a:solidFill>
+                  <a:schemeClr val="tx1"/>
+                </a:solidFill>
+              </a:rPr>
+              <a:t> point,</a:t>
+            </a:r>
+          </a:p>
+          <a:p>
+            <a:r>
+              <a:rPr lang="en-ZA" sz="800" dirty="0" err="1">
+                <a:solidFill>
+                  <a:schemeClr val="tx1"/>
+                </a:solidFill>
+              </a:rPr>
+              <a:t>Tag_relative_strength</a:t>
+            </a:r>
+            <a:r>
+              <a:rPr lang="en-ZA" sz="800" dirty="0">
+                <a:solidFill>
+                  <a:schemeClr val="tx1"/>
+                </a:solidFill>
+              </a:rPr>
+              <a:t> decimal ,</a:t>
+            </a:r>
+          </a:p>
+          <a:p>
+            <a:r>
+              <a:rPr lang="en-ZA" sz="800" dirty="0" err="1">
+                <a:solidFill>
+                  <a:schemeClr val="tx1"/>
+                </a:solidFill>
+              </a:rPr>
+              <a:t>Sync_id</a:t>
+            </a:r>
+            <a:r>
+              <a:rPr lang="en-ZA" sz="800" dirty="0">
+                <a:solidFill>
+                  <a:schemeClr val="tx1"/>
+                </a:solidFill>
+              </a:rPr>
+              <a:t> varchar(30)</a:t>
+            </a:r>
+          </a:p>
+          <a:p>
+            <a:r>
+              <a:rPr lang="en-ZA" sz="800" dirty="0">
+                <a:solidFill>
+                  <a:schemeClr val="tx1"/>
+                </a:solidFill>
+              </a:rPr>
+              <a:t>);</a:t>
+            </a:r>
+          </a:p>
+        </p:txBody>
+      </p:sp>
+      <p:sp>
+        <p:nvSpPr>
+          <p:cNvPr id="11" name="Flowchart: Internal Storage 10">
+            <a:extLst>
+              <a:ext uri="{FF2B5EF4-FFF2-40B4-BE49-F238E27FC236}">
+                <a16:creationId xmlns:a16="http://schemas.microsoft.com/office/drawing/2014/main" id="{DF4D0790-BBAA-4811-878F-B53E0B10A281}"/>
+              </a:ext>
+            </a:extLst>
+          </p:cNvPr>
+          <p:cNvSpPr/>
+          <p:nvPr/>
+        </p:nvSpPr>
+        <p:spPr>
+          <a:xfrm>
+            <a:off x="7957794" y="1104508"/>
+            <a:ext cx="2790334" cy="1649690"/>
+          </a:xfrm>
+          <a:prstGeom prst="flowChartInternalStorage">
+            <a:avLst/>
+          </a:prstGeom>
+          <a:solidFill>
+            <a:schemeClr val="bg1"/>
+          </a:solidFill>
+        </p:spPr>
+        <p:style>
+          <a:lnRef idx="2">
+            <a:schemeClr val="accent1">
+              <a:shade val="50000"/>
+            </a:schemeClr>
+          </a:lnRef>
+          <a:fillRef idx="1">
+            <a:schemeClr val="accent1"/>
+          </a:fillRef>
+          <a:effectRef idx="0">
+            <a:schemeClr val="accent1"/>
+          </a:effectRef>
+          <a:fontRef idx="minor">
+            <a:schemeClr val="lt1"/>
+          </a:fontRef>
+        </p:style>
+        <p:txBody>
+          <a:bodyPr rtlCol="0" anchor="ctr"/>
+          <a:lstStyle/>
+          <a:p>
+            <a:r>
               <a:rPr lang="en-ZA" sz="900" b="1" dirty="0" err="1">
                 <a:solidFill>
                   <a:schemeClr val="tx1"/>
                 </a:solidFill>
               </a:rPr>
-              <a:t>Base_sync</a:t>
+              <a:t>Base_stations</a:t>
             </a:r>
             <a:endParaRPr lang="en-ZA" sz="900" b="1" dirty="0">
               <a:solidFill>
@@ -3866,58 +4121,12 @@
               <a:buChar char="•"/>
             </a:pPr>
             <a:r>
-              <a:rPr lang="en-ZA" sz="800" dirty="0" err="1">
-                <a:solidFill>
-                  <a:schemeClr val="tx1"/>
-                </a:solidFill>
-              </a:rPr>
-              <a:t>Unique_id</a:t>
-            </a:r>
-            <a:r>
               <a:rPr lang="en-ZA" sz="800" dirty="0">
                 <a:solidFill>
                   <a:schemeClr val="tx1"/>
                 </a:solidFill>
               </a:rPr>
-              <a:t> – Primary auto</a:t>
-            </a:r>
-          </a:p>
-          <a:p>
-            <a:pPr marL="171450" indent="-171450">
-              <a:buFont typeface="Arial" panose="020B0604020202020204" pitchFamily="34" charset="0"/>
-              <a:buChar char="•"/>
-            </a:pPr>
-            <a:r>
-              <a:rPr lang="en-ZA" sz="800" dirty="0" err="1">
-                <a:solidFill>
-                  <a:schemeClr val="tx1"/>
-                </a:solidFill>
-              </a:rPr>
-              <a:t>User_id</a:t>
-            </a:r>
-            <a:r>
-              <a:rPr lang="en-ZA" sz="800" dirty="0">
-                <a:solidFill>
-                  <a:schemeClr val="tx1"/>
-                </a:solidFill>
-              </a:rPr>
-              <a:t> -  Foreign Key (</a:t>
-            </a:r>
-            <a:r>
-              <a:rPr lang="en-ZA" sz="800" dirty="0" err="1">
-                <a:solidFill>
-                  <a:schemeClr val="tx1"/>
-                </a:solidFill>
-              </a:rPr>
-              <a:t>user.unique_id</a:t>
-            </a:r>
-            <a:r>
-              <a:rPr lang="en-ZA" sz="800" dirty="0">
-                <a:solidFill>
-                  <a:schemeClr val="tx1"/>
-                </a:solidFill>
-              </a:rPr>
-              <a:t>)</a:t>
+              <a:t>id – Primary auto</a:t>
             </a:r>
           </a:p>
           <a:p>
@@ -3953,7 +4162,7 @@
                   <a:schemeClr val="tx1"/>
                 </a:solidFill>
               </a:rPr>
-              <a:t>Tag_id</a:t>
+              <a:t>Nice_name</a:t>
             </a:r>
             <a:r>
               <a:rPr lang="en-ZA" sz="800" dirty="0">
@@ -3963,6 +4172,62 @@
               </a:rPr>
               <a:t> – varchar(30)</a:t>
             </a:r>
+            <a:endParaRPr lang="en-ZA" sz="800" dirty="0"/>
+          </a:p>
+        </p:txBody>
+      </p:sp>
+      <p:sp>
+        <p:nvSpPr>
+          <p:cNvPr id="12" name="Flowchart: Internal Storage 11">
+            <a:extLst>
+              <a:ext uri="{FF2B5EF4-FFF2-40B4-BE49-F238E27FC236}">
+                <a16:creationId xmlns:a16="http://schemas.microsoft.com/office/drawing/2014/main" id="{B9E10DBF-E6FB-4CF0-9284-36F69102F304}"/>
+              </a:ext>
+            </a:extLst>
+          </p:cNvPr>
+          <p:cNvSpPr/>
+          <p:nvPr/>
+        </p:nvSpPr>
+        <p:spPr>
+          <a:xfrm>
+            <a:off x="7957794" y="3093563"/>
+            <a:ext cx="2790334" cy="1649690"/>
+          </a:xfrm>
+          <a:prstGeom prst="flowChartInternalStorage">
+            <a:avLst/>
+          </a:prstGeom>
+          <a:solidFill>
+            <a:schemeClr val="bg1"/>
+          </a:solidFill>
+        </p:spPr>
+        <p:style>
+          <a:lnRef idx="2">
+            <a:schemeClr val="accent1">
+              <a:shade val="50000"/>
+            </a:schemeClr>
+          </a:lnRef>
+          <a:fillRef idx="1">
+            <a:schemeClr val="accent1"/>
+          </a:fillRef>
+          <a:effectRef idx="0">
+            <a:schemeClr val="accent1"/>
+          </a:effectRef>
+          <a:fontRef idx="minor">
+            <a:schemeClr val="lt1"/>
+          </a:fontRef>
+        </p:style>
+        <p:txBody>
+          <a:bodyPr rtlCol="0" anchor="ctr"/>
+          <a:lstStyle/>
+          <a:p>
+            <a:r>
+              <a:rPr lang="en-ZA" sz="900" b="1" dirty="0">
+                <a:solidFill>
+                  <a:schemeClr val="tx1"/>
+                </a:solidFill>
+              </a:rPr>
+              <a:t>Tag</a:t>
+            </a:r>
           </a:p>
           <a:p>
             <a:pPr marL="171450" indent="-171450">
@@ -3975,21 +4240,7 @@
                   <a:schemeClr val="tx1"/>
                 </a:solidFill>
               </a:rPr>
-              <a:t>Timestamp-varchar(14) (yyyymmddhh24miss)</a:t>
-            </a:r>
-          </a:p>
-          <a:p>
-            <a:pPr marL="171450" indent="-171450">
-              <a:buFont typeface="Arial" panose="020B0604020202020204" pitchFamily="34" charset="0"/>
-              <a:buChar char="•"/>
-            </a:pPr>
-            <a:r>
-              <a:rPr lang="en-ZA" sz="800" dirty="0">
-                <a:solidFill>
-                  <a:schemeClr val="tx1"/>
-                </a:solidFill>
-              </a:rPr>
-              <a:t>GPS_LOCAL – point</a:t>
+              <a:t>id – Primary auto</a:t>
             </a:r>
           </a:p>
           <a:p>
@@ -4003,137 +4254,7 @@
                   <a:schemeClr val="tx1"/>
                 </a:solidFill>
               </a:rPr>
-              <a:t>Tag_relative_strength</a:t>
-            </a:r>
-            <a:r>
-              <a:rPr lang="en-ZA" sz="800" dirty="0">
-                <a:solidFill>
-                  <a:schemeClr val="tx1"/>
-                </a:solidFill>
-              </a:rPr>
-              <a:t> – int</a:t>
-            </a:r>
-          </a:p>
-          <a:p>
-            <a:pPr marL="171450" indent="-171450">
-              <a:buFont typeface="Arial" panose="020B0604020202020204" pitchFamily="34" charset="0"/>
-              <a:buChar char="•"/>
-            </a:pPr>
-            <a:r>
-              <a:rPr lang="en-ZA" sz="800" dirty="0" err="1">
-                <a:solidFill>
-                  <a:schemeClr val="tx1"/>
-                </a:solidFill>
-              </a:rPr>
-              <a:t>Sync_id</a:t>
-            </a:r>
-            <a:r>
-              <a:rPr lang="en-ZA" sz="800" dirty="0">
-                <a:solidFill>
-                  <a:schemeClr val="tx1"/>
-                </a:solidFill>
-              </a:rPr>
-              <a:t> – varchar30</a:t>
-            </a:r>
-            <a:r>
-              <a:rPr lang="en-ZA" sz="800" dirty="0"/>
-              <a:t>e</a:t>
-            </a:r>
-          </a:p>
-        </p:txBody>
-      </p:sp>
-      <p:sp>
-        <p:nvSpPr>
-          <p:cNvPr id="11" name="Flowchart: Internal Storage 10">
-            <a:extLst>
-              <a:ext uri="{FF2B5EF4-FFF2-40B4-BE49-F238E27FC236}">
-                <a16:creationId xmlns:a16="http://schemas.microsoft.com/office/drawing/2014/main" id="{DF4D0790-BBAA-4811-878F-B53E0B10A281}"/>
-              </a:ext>
-            </a:extLst>
-          </p:cNvPr>
-          <p:cNvSpPr/>
-          <p:nvPr/>
-        </p:nvSpPr>
-        <p:spPr>
-          <a:xfrm>
-            <a:off x="7957794" y="1104508"/>
-            <a:ext cx="2790334" cy="1649690"/>
-          </a:xfrm>
-          <a:prstGeom prst="flowChartInternalStorage">
-            <a:avLst/>
-          </a:prstGeom>
-          <a:solidFill>
-            <a:schemeClr val="bg1"/>
-          </a:solidFill>
-        </p:spPr>
-        <p:style>
-          <a:lnRef idx="2">
-            <a:schemeClr val="accent1">
-              <a:shade val="50000"/>
-            </a:schemeClr>
-          </a:lnRef>
-          <a:fillRef idx="1">
-            <a:schemeClr val="accent1"/>
-          </a:fillRef>
-          <a:effectRef idx="0">
-            <a:schemeClr val="accent1"/>
-          </a:effectRef>
-          <a:fontRef idx="minor">
-            <a:schemeClr val="lt1"/>
-          </a:fontRef>
-        </p:style>
-        <p:txBody>
-          <a:bodyPr rtlCol="0" anchor="ctr"/>
-          <a:lstStyle/>
-          <a:p>
-            <a:r>
-              <a:rPr lang="en-ZA" sz="900" b="1" dirty="0" err="1">
-                <a:solidFill>
-                  <a:schemeClr val="tx1"/>
-                </a:solidFill>
-              </a:rPr>
-              <a:t>Base_stations</a:t>
-            </a:r>
-            <a:endParaRPr lang="en-ZA" sz="900" b="1" dirty="0">
-              <a:solidFill>
-                <a:schemeClr val="tx1"/>
-              </a:solidFill>
-            </a:endParaRPr>
-          </a:p>
-          <a:p>
-            <a:pPr marL="171450" indent="-171450">
-              <a:buFont typeface="Arial" panose="020B0604020202020204" pitchFamily="34" charset="0"/>
-              <a:buChar char="•"/>
-            </a:pPr>
-            <a:r>
-              <a:rPr lang="en-ZA" sz="800" dirty="0" err="1">
-                <a:solidFill>
-                  <a:schemeClr val="tx1"/>
-                </a:solidFill>
-              </a:rPr>
-              <a:t>Unique_id</a:t>
-            </a:r>
-            <a:r>
-              <a:rPr lang="en-ZA" sz="800" dirty="0">
-                <a:solidFill>
-                  <a:schemeClr val="tx1"/>
-                </a:solidFill>
-              </a:rPr>
-              <a:t> – Primary auto</a:t>
-            </a:r>
-          </a:p>
-          <a:p>
-            <a:pPr marL="171450" indent="-171450">
-              <a:buFont typeface="Arial" panose="020B0604020202020204" pitchFamily="34" charset="0"/>
-              <a:buChar char="•"/>
-            </a:pPr>
-            <a:r>
-              <a:rPr lang="en-ZA" sz="800" dirty="0" err="1">
-                <a:solidFill>
-                  <a:schemeClr val="tx1"/>
-                </a:solidFill>
-              </a:rPr>
-              <a:t>Base_ID</a:t>
+              <a:t>Tag_id</a:t>
             </a:r>
             <a:r>
               <a:rPr lang="en-ZA" sz="800" dirty="0">
@@ -4163,128 +4284,6 @@
                   <a:schemeClr val="tx1"/>
                 </a:solidFill>
               </a:rPr>
-              <a:t> – varchar(30)</a:t>
-            </a:r>
-            <a:endParaRPr lang="en-ZA" sz="800" dirty="0"/>
-          </a:p>
-        </p:txBody>
-      </p:sp>
-      <p:sp>
-        <p:nvSpPr>
-          <p:cNvPr id="12" name="Flowchart: Internal Storage 11">
-            <a:extLst>
-              <a:ext uri="{FF2B5EF4-FFF2-40B4-BE49-F238E27FC236}">
-                <a16:creationId xmlns:a16="http://schemas.microsoft.com/office/drawing/2014/main" id="{B9E10DBF-E6FB-4CF0-9284-36F69102F304}"/>
-              </a:ext>
-            </a:extLst>
-          </p:cNvPr>
-          <p:cNvSpPr/>
-          <p:nvPr/>
-        </p:nvSpPr>
-        <p:spPr>
-          <a:xfrm>
-            <a:off x="7957794" y="3093563"/>
-            <a:ext cx="2790334" cy="1649690"/>
-          </a:xfrm>
-          <a:prstGeom prst="flowChartInternalStorage">
-            <a:avLst/>
-          </a:prstGeom>
-          <a:solidFill>
-            <a:schemeClr val="bg1"/>
-          </a:solidFill>
-        </p:spPr>
-        <p:style>
-          <a:lnRef idx="2">
-            <a:schemeClr val="accent1">
-              <a:shade val="50000"/>
-            </a:schemeClr>
-          </a:lnRef>
-          <a:fillRef idx="1">
-            <a:schemeClr val="accent1"/>
-          </a:fillRef>
-          <a:effectRef idx="0">
-            <a:schemeClr val="accent1"/>
-          </a:effectRef>
-          <a:fontRef idx="minor">
-            <a:schemeClr val="lt1"/>
-          </a:fontRef>
-        </p:style>
-        <p:txBody>
-          <a:bodyPr rtlCol="0" anchor="ctr"/>
-          <a:lstStyle/>
-          <a:p>
-            <a:r>
-              <a:rPr lang="en-ZA" sz="900" b="1" dirty="0">
-                <a:solidFill>
-                  <a:schemeClr val="tx1"/>
-                </a:solidFill>
-              </a:rPr>
-              <a:t>Tag</a:t>
-            </a:r>
-          </a:p>
-          <a:p>
-            <a:pPr marL="171450" indent="-171450">
-              <a:buFont typeface="Arial" panose="020B0604020202020204" pitchFamily="34" charset="0"/>
-              <a:buChar char="•"/>
-            </a:pPr>
-            <a:r>
-              <a:rPr lang="en-ZA" sz="800" dirty="0" err="1">
-                <a:solidFill>
-                  <a:schemeClr val="tx1"/>
-                </a:solidFill>
-              </a:rPr>
-              <a:t>Unique_id</a:t>
-            </a:r>
-            <a:r>
-              <a:rPr lang="en-ZA" sz="800" dirty="0">
-                <a:solidFill>
-                  <a:schemeClr val="tx1"/>
-                </a:solidFill>
-              </a:rPr>
-              <a:t> – Primary auto</a:t>
-            </a:r>
-          </a:p>
-          <a:p>
-            <a:pPr marL="171450" indent="-171450">
-              <a:buFont typeface="Arial" panose="020B0604020202020204" pitchFamily="34" charset="0"/>
-              <a:buChar char="•"/>
-            </a:pPr>
-            <a:r>
-              <a:rPr lang="en-ZA" sz="800" dirty="0" err="1">
-                <a:solidFill>
-                  <a:schemeClr val="tx1"/>
-                </a:solidFill>
-              </a:rPr>
-              <a:t>Tag_id</a:t>
-            </a:r>
-            <a:r>
-              <a:rPr lang="en-ZA" sz="800" dirty="0">
-                <a:solidFill>
-                  <a:schemeClr val="tx1"/>
-                </a:solidFill>
-              </a:rPr>
-              <a:t> – varchar(30)</a:t>
-            </a:r>
-          </a:p>
-          <a:p>
-            <a:pPr marL="171450" indent="-171450">
-              <a:buFont typeface="Arial" panose="020B0604020202020204" pitchFamily="34" charset="0"/>
-              <a:buChar char="•"/>
-            </a:pPr>
-            <a:r>
-              <a:rPr lang="en-ZA" sz="800" dirty="0" err="1">
-                <a:solidFill>
-                  <a:schemeClr val="tx1"/>
-                </a:solidFill>
-              </a:rPr>
-              <a:t>Nice_name</a:t>
-            </a:r>
-            <a:r>
-              <a:rPr lang="en-ZA" sz="800" dirty="0">
-                <a:solidFill>
-                  <a:schemeClr val="tx1"/>
-                </a:solidFill>
-              </a:rPr>
               <a:t>-varchar(30)</a:t>
             </a:r>
             <a:endParaRPr lang="en-ZA" sz="800" dirty="0"/>
@@ -4301,6 +4300,7 @@
             </a:extLst>
           </p:cNvPr>
           <p:cNvCxnSpPr>
+            <a:cxnSpLocks/>
             <a:stCxn id="11" idx="1"/>
             <a:endCxn id="8" idx="3"/>
           </p:cNvCxnSpPr>
@@ -4308,8 +4308,8 @@
         </p:nvCxnSpPr>
         <p:spPr>
           <a:xfrm rot="10800000" flipV="1">
-            <a:off x="6862714" y="1929353"/>
-            <a:ext cx="1095081" cy="1327608"/>
+            <a:off x="7090914" y="1929353"/>
+            <a:ext cx="866881" cy="1327608"/>
           </a:xfrm>
           <a:prstGeom prst="bentConnector3">
             <a:avLst/>
@@ -4342,13 +4342,14 @@
           <p:cNvCxnSpPr>
             <a:cxnSpLocks/>
             <a:stCxn id="12" idx="1"/>
+            <a:endCxn id="8" idx="3"/>
           </p:cNvCxnSpPr>
           <p:nvPr/>
         </p:nvCxnSpPr>
         <p:spPr>
           <a:xfrm rot="10800000">
-            <a:off x="6862714" y="3506772"/>
-            <a:ext cx="1095081" cy="411637"/>
+            <a:off x="7090914" y="3256962"/>
+            <a:ext cx="866881" cy="661447"/>
           </a:xfrm>
           <a:prstGeom prst="bentConnector3">
             <a:avLst/>
@@ -4470,7 +4471,7 @@
         </p:blipFill>
         <p:spPr>
           <a:xfrm>
-            <a:off x="6874102" y="2971800"/>
+            <a:off x="7066483" y="2980931"/>
             <a:ext cx="285161" cy="285161"/>
           </a:xfrm>
           <a:prstGeom prst="rect">
@@ -4509,7 +4510,7 @@
         </p:blipFill>
         <p:spPr>
           <a:xfrm>
-            <a:off x="6862712" y="3495480"/>
+            <a:off x="7103076" y="3329824"/>
             <a:ext cx="285161" cy="285161"/>
           </a:xfrm>
           <a:prstGeom prst="rect">
@@ -4576,20 +4577,12 @@
               <a:buChar char="•"/>
             </a:pPr>
             <a:r>
-              <a:rPr lang="en-ZA" sz="800" dirty="0" err="1">
-                <a:solidFill>
-                  <a:schemeClr val="tx1"/>
-                </a:solidFill>
-              </a:rPr>
-              <a:t>Unique_id</a:t>
-            </a:r>
-            <a:r>
               <a:rPr lang="en-ZA" sz="800" dirty="0">
                 <a:solidFill>
                   <a:schemeClr val="tx1"/>
                 </a:solidFill>
               </a:rPr>
-              <a:t> – Primary auto</a:t>
+              <a:t>id – Primary auto</a:t>
             </a:r>
           </a:p>
           <a:p>
@@ -4834,39 +4827,26 @@
           <a:lstStyle/>
           <a:p>
             <a:r>
-              <a:rPr lang="en-ZA" sz="900" b="1" dirty="0" err="1">
+              <a:rPr lang="en-ZA" sz="900" b="1" dirty="0">
                 <a:solidFill>
                   <a:schemeClr val="tx1"/>
                 </a:solidFill>
               </a:rPr>
-              <a:t>USER_Billing</a:t>
-            </a:r>
-            <a:endParaRPr lang="en-ZA" sz="900" b="1" dirty="0">
-              <a:solidFill>
-                <a:schemeClr val="tx1"/>
-              </a:solidFill>
-            </a:endParaRPr>
+              <a:t>Billing</a:t>
+            </a:r>
           </a:p>
           <a:p>
             <a:pPr marL="171450" indent="-171450">
               <a:buFont typeface="Arial" panose="020B0604020202020204" pitchFamily="34" charset="0"/>
               <a:buChar char="•"/>
             </a:pPr>
-            <a:r>
-              <a:rPr lang="en-ZA" sz="800" dirty="0" err="1">
-                <a:solidFill>
-                  <a:schemeClr val="tx1"/>
-                </a:solidFill>
-              </a:rPr>
-              <a:t>Unique_id</a:t>
-            </a:r>
             <a:r>
               <a:rPr lang="en-ZA" sz="800" dirty="0">
                 <a:solidFill>
                   <a:schemeClr val="tx1"/>
                 </a:solidFill>
               </a:rPr>
-              <a:t> – Primary auto</a:t>
+              <a:t>id – Primary auto</a:t>
             </a:r>
           </a:p>
           <a:p>

</xml_diff>